<commit_message>
finish exam 3 ppt
</commit_message>
<xml_diff>
--- a/SI - 121/Exam 3 Review Ch 6-8.pptx
+++ b/SI - 121/Exam 3 Review Ch 6-8.pptx
@@ -261,7 +261,7 @@
           <a:p>
             <a:fld id="{6455B870-2AC2-4EDD-988A-AAB36F68BD8B}" type="datetimeFigureOut">
               <a:rPr lang="en-US" smtClean="0"/>
-              <a:t>3/12/2018</a:t>
+              <a:t>3/13/2018</a:t>
             </a:fld>
             <a:endParaRPr lang="en-US"/>
           </a:p>
@@ -431,7 +431,7 @@
           <a:p>
             <a:fld id="{6455B870-2AC2-4EDD-988A-AAB36F68BD8B}" type="datetimeFigureOut">
               <a:rPr lang="en-US" smtClean="0"/>
-              <a:t>3/12/2018</a:t>
+              <a:t>3/13/2018</a:t>
             </a:fld>
             <a:endParaRPr lang="en-US"/>
           </a:p>
@@ -611,7 +611,7 @@
           <a:p>
             <a:fld id="{6455B870-2AC2-4EDD-988A-AAB36F68BD8B}" type="datetimeFigureOut">
               <a:rPr lang="en-US" smtClean="0"/>
-              <a:t>3/12/2018</a:t>
+              <a:t>3/13/2018</a:t>
             </a:fld>
             <a:endParaRPr lang="en-US"/>
           </a:p>
@@ -781,7 +781,7 @@
           <a:p>
             <a:fld id="{6455B870-2AC2-4EDD-988A-AAB36F68BD8B}" type="datetimeFigureOut">
               <a:rPr lang="en-US" smtClean="0"/>
-              <a:t>3/12/2018</a:t>
+              <a:t>3/13/2018</a:t>
             </a:fld>
             <a:endParaRPr lang="en-US"/>
           </a:p>
@@ -1027,7 +1027,7 @@
           <a:p>
             <a:fld id="{6455B870-2AC2-4EDD-988A-AAB36F68BD8B}" type="datetimeFigureOut">
               <a:rPr lang="en-US" smtClean="0"/>
-              <a:t>3/12/2018</a:t>
+              <a:t>3/13/2018</a:t>
             </a:fld>
             <a:endParaRPr lang="en-US"/>
           </a:p>
@@ -1259,7 +1259,7 @@
           <a:p>
             <a:fld id="{6455B870-2AC2-4EDD-988A-AAB36F68BD8B}" type="datetimeFigureOut">
               <a:rPr lang="en-US" smtClean="0"/>
-              <a:t>3/12/2018</a:t>
+              <a:t>3/13/2018</a:t>
             </a:fld>
             <a:endParaRPr lang="en-US"/>
           </a:p>
@@ -1626,7 +1626,7 @@
           <a:p>
             <a:fld id="{6455B870-2AC2-4EDD-988A-AAB36F68BD8B}" type="datetimeFigureOut">
               <a:rPr lang="en-US" smtClean="0"/>
-              <a:t>3/12/2018</a:t>
+              <a:t>3/13/2018</a:t>
             </a:fld>
             <a:endParaRPr lang="en-US"/>
           </a:p>
@@ -1744,7 +1744,7 @@
           <a:p>
             <a:fld id="{6455B870-2AC2-4EDD-988A-AAB36F68BD8B}" type="datetimeFigureOut">
               <a:rPr lang="en-US" smtClean="0"/>
-              <a:t>3/12/2018</a:t>
+              <a:t>3/13/2018</a:t>
             </a:fld>
             <a:endParaRPr lang="en-US"/>
           </a:p>
@@ -1839,7 +1839,7 @@
           <a:p>
             <a:fld id="{6455B870-2AC2-4EDD-988A-AAB36F68BD8B}" type="datetimeFigureOut">
               <a:rPr lang="en-US" smtClean="0"/>
-              <a:t>3/12/2018</a:t>
+              <a:t>3/13/2018</a:t>
             </a:fld>
             <a:endParaRPr lang="en-US"/>
           </a:p>
@@ -2116,7 +2116,7 @@
           <a:p>
             <a:fld id="{6455B870-2AC2-4EDD-988A-AAB36F68BD8B}" type="datetimeFigureOut">
               <a:rPr lang="en-US" smtClean="0"/>
-              <a:t>3/12/2018</a:t>
+              <a:t>3/13/2018</a:t>
             </a:fld>
             <a:endParaRPr lang="en-US"/>
           </a:p>
@@ -2373,7 +2373,7 @@
           <a:p>
             <a:fld id="{6455B870-2AC2-4EDD-988A-AAB36F68BD8B}" type="datetimeFigureOut">
               <a:rPr lang="en-US" smtClean="0"/>
-              <a:t>3/12/2018</a:t>
+              <a:t>3/13/2018</a:t>
             </a:fld>
             <a:endParaRPr lang="en-US"/>
           </a:p>
@@ -2586,7 +2586,7 @@
           <a:p>
             <a:fld id="{6455B870-2AC2-4EDD-988A-AAB36F68BD8B}" type="datetimeFigureOut">
               <a:rPr lang="en-US" smtClean="0"/>
-              <a:t>3/12/2018</a:t>
+              <a:t>3/13/2018</a:t>
             </a:fld>
             <a:endParaRPr lang="en-US"/>
           </a:p>
@@ -3141,7 +3141,7 @@
           <a:p>
             <a:r>
               <a:rPr lang="en-US" dirty="0"/>
-              <a:t>ANS</a:t>
+              <a:t>-1060 W</a:t>
             </a:r>
           </a:p>
         </p:txBody>
@@ -3176,8 +3176,8 @@
           <a:chExt cx="0" cy="0"/>
         </a:xfrm>
       </p:grpSpPr>
-      <mc:AlternateContent xmlns:mc="http://schemas.openxmlformats.org/markup-compatibility/2006">
-        <mc:Choice xmlns:a14="http://schemas.microsoft.com/office/drawing/2010/main" Requires="a14">
+      <mc:AlternateContent xmlns:mc="http://schemas.openxmlformats.org/markup-compatibility/2006" xmlns:a14="http://schemas.microsoft.com/office/drawing/2010/main">
+        <mc:Choice Requires="a14">
           <p:sp>
             <p:nvSpPr>
               <p:cNvPr id="2" name="Title 1">
@@ -3210,41 +3210,55 @@
                     <m:sSub>
                       <m:sSubPr>
                         <m:ctrlPr>
-                          <a:rPr lang="en-US" sz="3600" i="1"/>
+                          <a:rPr lang="en-US" sz="3600" i="1">
+                            <a:latin typeface="Cambria Math" panose="02040503050406030204" pitchFamily="18" charset="0"/>
+                          </a:rPr>
                         </m:ctrlPr>
                       </m:sSubPr>
                       <m:e>
                         <m:r>
-                          <a:rPr lang="en-US" sz="3600" i="1"/>
+                          <a:rPr lang="en-US" sz="3600" i="1">
+                            <a:latin typeface="Cambria Math" panose="02040503050406030204" pitchFamily="18" charset="0"/>
+                          </a:rPr>
                           <m:t>𝐹</m:t>
                         </m:r>
                       </m:e>
                       <m:sub>
                         <m:r>
-                          <a:rPr lang="en-US" sz="3600" i="1"/>
+                          <a:rPr lang="en-US" sz="3600" i="1">
+                            <a:latin typeface="Cambria Math" panose="02040503050406030204" pitchFamily="18" charset="0"/>
+                          </a:rPr>
                           <m:t>𝑠</m:t>
                         </m:r>
                       </m:sub>
                     </m:sSub>
                     <m:r>
-                      <a:rPr lang="en-US" sz="3600" i="1"/>
+                      <a:rPr lang="en-US" sz="3600" i="1">
+                        <a:latin typeface="Cambria Math" panose="02040503050406030204" pitchFamily="18" charset="0"/>
+                      </a:rPr>
                       <m:t>=30</m:t>
                     </m:r>
                     <m:sSup>
                       <m:sSupPr>
                         <m:ctrlPr>
-                          <a:rPr lang="en-US" sz="3600" i="1"/>
+                          <a:rPr lang="en-US" sz="3600" i="1">
+                            <a:latin typeface="Cambria Math" panose="02040503050406030204" pitchFamily="18" charset="0"/>
+                          </a:rPr>
                         </m:ctrlPr>
                       </m:sSupPr>
                       <m:e>
                         <m:r>
-                          <a:rPr lang="en-US" sz="3600" i="1"/>
+                          <a:rPr lang="en-US" sz="3600" i="1">
+                            <a:latin typeface="Cambria Math" panose="02040503050406030204" pitchFamily="18" charset="0"/>
+                          </a:rPr>
                           <m:t>𝑥</m:t>
                         </m:r>
                       </m:e>
                       <m:sup>
                         <m:r>
-                          <a:rPr lang="en-US" sz="3600" i="1"/>
+                          <a:rPr lang="en-US" sz="3600" i="1">
+                            <a:latin typeface="Cambria Math" panose="02040503050406030204" pitchFamily="18" charset="0"/>
+                          </a:rPr>
                           <m:t>2</m:t>
                         </m:r>
                       </m:sup>
@@ -3259,7 +3273,7 @@
             </p:txBody>
           </p:sp>
         </mc:Choice>
-        <mc:Fallback>
+        <mc:Fallback xmlns="">
           <p:sp>
             <p:nvSpPr>
               <p:cNvPr id="2" name="Title 1">
@@ -3382,7 +3396,7 @@
           <a:p>
             <a:r>
               <a:rPr lang="en-US" sz="3200" dirty="0"/>
-              <a:t>Block of mass 10 kg (starting from rest) slides down the ramp inclined at an angle θ above horizontal. Block moves the distance 7 m along the ramp and at the end of it encounters a spring with the force constant 1200 N/m compressing it by 35 cm. </a:t>
+              <a:t>Block of mass 10 kg (starting from rest) slides down the ramp inclined at an angle θ above horizontal. Block moves the distance 7 m along the ramp before encountering a spring with force constant 1200 N/m compressing it by 35 cm. </a:t>
             </a:r>
             <a:br>
               <a:rPr lang="en-US" sz="3200" dirty="0"/>
@@ -3390,13 +3404,6 @@
             <a:r>
               <a:rPr lang="en-US" sz="3200" dirty="0"/>
               <a:t>(a) Find the angle θ if the ramp is frictionless.</a:t>
-            </a:r>
-            <a:br>
-              <a:rPr lang="en-US" sz="3200" dirty="0"/>
-            </a:br>
-            <a:r>
-              <a:rPr lang="en-US" sz="3200" dirty="0"/>
-              <a:t>(a) Find the angle θ if the coefficient of kinetic friction between the block and the ramp is 0.15.</a:t>
             </a:r>
           </a:p>
         </p:txBody>
@@ -3424,7 +3431,7 @@
           <a:p>
             <a:r>
               <a:rPr lang="en-US" dirty="0"/>
-              <a:t>ANS</a:t>
+              <a:t>5.9 degrees</a:t>
             </a:r>
           </a:p>
         </p:txBody>
@@ -3572,7 +3579,7 @@
           <a:p>
             <a:r>
               <a:rPr lang="en-US" sz="3200" dirty="0"/>
-              <a:t>A 25 kg rock approaches the foot of a hill with a speed of 17 m/s. This hill slopes upward at a constant angle The coefficient of 35 degrees above the horizontal. The coefficient of kinetic friction is 0.19. Find the maximum height reached by the rock, and the rocks’ speed at the bottom of the hill both on the way up and back down.</a:t>
+              <a:t>A 25 kg rock approaches the foot of a hill with a speed of 17 m/s. This hill slopes upward at a constant angle of 35 degrees above the horizontal. The coefficient of kinetic friction is 0.19. Find the maximum height reached by the rock, and the rock’s speed at the bottom of the hill on the way back down.</a:t>
             </a:r>
           </a:p>
         </p:txBody>
@@ -3600,7 +3607,7 @@
           <a:p>
             <a:r>
               <a:rPr lang="en-US" dirty="0"/>
-              <a:t>ANS</a:t>
+              <a:t>11.6 m</a:t>
             </a:r>
           </a:p>
         </p:txBody>
@@ -3661,7 +3668,7 @@
             <a:pPr lvl="0"/>
             <a:r>
               <a:rPr lang="en-US" sz="3200" dirty="0"/>
-              <a:t>A 0.75 kg basketball strikes the backboard while travelling at an angle of 45 degrees above the horizontal with a speed of 20 m/s, and it leaves the backboard travelling horizontally with a speed of 15 m/s. If the ball and backboard are in contact for 1.25 </a:t>
+              <a:t>In a 2-dimensional system, A 0.75 kg basketball strikes the backboard while travelling at an angle of 45 degrees above the horizontal with a speed of 20 m/s, and it leaves the backboard travelling horizontally with a speed of 15 m/s. If the ball and backboard are in contact for 1.25 </a:t>
             </a:r>
             <a:r>
               <a:rPr lang="en-US" sz="3200" dirty="0" err="1"/>
@@ -3669,7 +3676,7 @@
             </a:r>
             <a:r>
               <a:rPr lang="en-US" sz="3200" dirty="0"/>
-              <a:t>, find the horizontal and vertical components of the force acting on the ball.</a:t>
+              <a:t>, find the horizontal and vertical components of the average net force acting on the ball.</a:t>
             </a:r>
           </a:p>
         </p:txBody>
@@ -3696,9 +3703,10 @@
           <a:lstStyle/>
           <a:p>
             <a:r>
-              <a:rPr lang="en-US" dirty="0"/>
-              <a:t>ANS</a:t>
-            </a:r>
+              <a:rPr lang="en-US"/>
+              <a:t>18000 N, -8500 N</a:t>
+            </a:r>
+            <a:endParaRPr lang="en-US" dirty="0"/>
           </a:p>
         </p:txBody>
       </p:sp>
@@ -3757,7 +3765,7 @@
           <a:p>
             <a:r>
               <a:rPr lang="en-US" sz="3200" dirty="0"/>
-              <a:t>Two billiard balls of equal mass collide on a pool table. Ball A which was initially travelling at 2 m/s, is deflected 20 degrees from its original direction. Asteroid B was originally at rest, and travels 60 degrees from the original direction of A. Find the speed of each asteroid after the collision and find the fraction of the kinetic energy of asteroid A dissipated during the collision. </a:t>
+              <a:t>Two billiard balls of equal mass collide on a pool table. Ball A which was initially travelling at 2 m/s, is deflected 20 degrees from its original direction. Ball B was originally at rest, and travels 60 degrees from the original direction of A. Find the speed of each ball after the collision and find the fraction of the kinetic energy dissipated during the collision. </a:t>
             </a:r>
           </a:p>
         </p:txBody>
@@ -3785,7 +3793,7 @@
           <a:p>
             <a:r>
               <a:rPr lang="en-US" dirty="0"/>
-              <a:t>ANS</a:t>
+              <a:t>1.8, 0.69; 7%</a:t>
             </a:r>
           </a:p>
         </p:txBody>
@@ -3962,7 +3970,7 @@
           <a:p>
             <a:r>
               <a:rPr lang="en-US" dirty="0"/>
-              <a:t>ANS</a:t>
+              <a:t>Heavier: 6.8 m/s, Lighter: 3.1 m/s</a:t>
             </a:r>
           </a:p>
         </p:txBody>
@@ -4022,7 +4030,7 @@
           <a:p>
             <a:r>
               <a:rPr lang="en-US" sz="3600" dirty="0"/>
-              <a:t>A 8 kg ball is hanging from the ceiling by a light string 120 cm long. If the ball is struck by  a 2 kg ball moving 7 m/s at an angle 60 degrees above the horizontal in an elastic collision, find the tension of the wire just after the collision. </a:t>
+              <a:t>An 8 kg ball is hanging from the ceiling by a light string 120 cm long. If the ball is struck by  a 2 kg ball moving 7 m/s horizontally in a perfectly elastic collision, find (a) the velocity of each ball after and (b) the tension of the string just after the collision. </a:t>
             </a:r>
           </a:p>
         </p:txBody>
@@ -4050,7 +4058,13 @@
           <a:p>
             <a:r>
               <a:rPr lang="en-US" dirty="0"/>
-              <a:t>ANS</a:t>
+              <a:t>2.8 m/s, -4.2 m/s; </a:t>
+            </a:r>
+          </a:p>
+          <a:p>
+            <a:r>
+              <a:rPr lang="en-US" dirty="0"/>
+              <a:t>130 N</a:t>
             </a:r>
           </a:p>
         </p:txBody>
@@ -4113,8 +4127,8 @@
           </a:p>
         </p:txBody>
       </p:sp>
-      <mc:AlternateContent xmlns:mc="http://schemas.openxmlformats.org/markup-compatibility/2006">
-        <mc:Choice xmlns:a14="http://schemas.microsoft.com/office/drawing/2010/main" Requires="a14">
+      <mc:AlternateContent xmlns:mc="http://schemas.openxmlformats.org/markup-compatibility/2006" xmlns:a14="http://schemas.microsoft.com/office/drawing/2010/main">
+        <mc:Choice Requires="a14">
           <p:sp>
             <p:nvSpPr>
               <p:cNvPr id="3" name="Content Placeholder 2">
@@ -4654,7 +4668,7 @@
             </p:txBody>
           </p:sp>
         </mc:Choice>
-        <mc:Fallback>
+        <mc:Fallback xmlns="">
           <p:sp>
             <p:nvSpPr>
               <p:cNvPr id="3" name="Content Placeholder 2">
@@ -4752,8 +4766,8 @@
           </a:p>
         </p:txBody>
       </p:sp>
-      <mc:AlternateContent xmlns:mc="http://schemas.openxmlformats.org/markup-compatibility/2006">
-        <mc:Choice xmlns:a14="http://schemas.microsoft.com/office/drawing/2010/main" Requires="a14">
+      <mc:AlternateContent xmlns:mc="http://schemas.openxmlformats.org/markup-compatibility/2006" xmlns:a14="http://schemas.microsoft.com/office/drawing/2010/main">
+        <mc:Choice Requires="a14">
           <p:sp>
             <p:nvSpPr>
               <p:cNvPr id="3" name="Content Placeholder 2">
@@ -5076,7 +5090,7 @@
             </p:txBody>
           </p:sp>
         </mc:Choice>
-        <mc:Fallback>
+        <mc:Fallback xmlns="">
           <p:sp>
             <p:nvSpPr>
               <p:cNvPr id="3" name="Content Placeholder 2">
@@ -5174,8 +5188,8 @@
           </a:p>
         </p:txBody>
       </p:sp>
-      <mc:AlternateContent xmlns:mc="http://schemas.openxmlformats.org/markup-compatibility/2006">
-        <mc:Choice xmlns:a14="http://schemas.microsoft.com/office/drawing/2010/main" Requires="a14">
+      <mc:AlternateContent xmlns:mc="http://schemas.openxmlformats.org/markup-compatibility/2006" xmlns:a14="http://schemas.microsoft.com/office/drawing/2010/main">
+        <mc:Choice Requires="a14">
           <p:sp>
             <p:nvSpPr>
               <p:cNvPr id="3" name="Content Placeholder 2">
@@ -5451,7 +5465,7 @@
                     <m:sSub>
                       <m:sSubPr>
                         <m:ctrlPr>
-                          <a:rPr lang="en-US" b="0" i="0" smtClean="0">
+                          <a:rPr lang="en-US" b="0" i="1" smtClean="0">
                             <a:latin typeface="Cambria Math" panose="02040503050406030204" pitchFamily="18" charset="0"/>
                           </a:rPr>
                         </m:ctrlPr>
@@ -5901,7 +5915,7 @@
             </p:txBody>
           </p:sp>
         </mc:Choice>
-        <mc:Fallback>
+        <mc:Fallback xmlns="">
           <p:sp>
             <p:nvSpPr>
               <p:cNvPr id="3" name="Content Placeholder 2">
@@ -6301,7 +6315,7 @@
           <a:p>
             <a:r>
               <a:rPr lang="en-US" dirty="0"/>
-              <a:t>ANS</a:t>
+              <a:t>866 J</a:t>
             </a:r>
           </a:p>
         </p:txBody>
@@ -6478,7 +6492,7 @@
           <a:p>
             <a:r>
               <a:rPr lang="en-US" dirty="0"/>
-              <a:t>ANS</a:t>
+              <a:t>9.3 m/s</a:t>
             </a:r>
           </a:p>
         </p:txBody>

</xml_diff>

<commit_message>
try changing i2c hardware config, start exam 4 review ppt
</commit_message>
<xml_diff>
--- a/SI - 121/Exam 3 Review Ch 6-8.pptx
+++ b/SI - 121/Exam 3 Review Ch 6-8.pptx
@@ -261,7 +261,7 @@
           <a:p>
             <a:fld id="{6455B870-2AC2-4EDD-988A-AAB36F68BD8B}" type="datetimeFigureOut">
               <a:rPr lang="en-US" smtClean="0"/>
-              <a:t>3/13/2018</a:t>
+              <a:t>4/4/2018</a:t>
             </a:fld>
             <a:endParaRPr lang="en-US"/>
           </a:p>
@@ -431,7 +431,7 @@
           <a:p>
             <a:fld id="{6455B870-2AC2-4EDD-988A-AAB36F68BD8B}" type="datetimeFigureOut">
               <a:rPr lang="en-US" smtClean="0"/>
-              <a:t>3/13/2018</a:t>
+              <a:t>4/4/2018</a:t>
             </a:fld>
             <a:endParaRPr lang="en-US"/>
           </a:p>
@@ -611,7 +611,7 @@
           <a:p>
             <a:fld id="{6455B870-2AC2-4EDD-988A-AAB36F68BD8B}" type="datetimeFigureOut">
               <a:rPr lang="en-US" smtClean="0"/>
-              <a:t>3/13/2018</a:t>
+              <a:t>4/4/2018</a:t>
             </a:fld>
             <a:endParaRPr lang="en-US"/>
           </a:p>
@@ -781,7 +781,7 @@
           <a:p>
             <a:fld id="{6455B870-2AC2-4EDD-988A-AAB36F68BD8B}" type="datetimeFigureOut">
               <a:rPr lang="en-US" smtClean="0"/>
-              <a:t>3/13/2018</a:t>
+              <a:t>4/4/2018</a:t>
             </a:fld>
             <a:endParaRPr lang="en-US"/>
           </a:p>
@@ -1027,7 +1027,7 @@
           <a:p>
             <a:fld id="{6455B870-2AC2-4EDD-988A-AAB36F68BD8B}" type="datetimeFigureOut">
               <a:rPr lang="en-US" smtClean="0"/>
-              <a:t>3/13/2018</a:t>
+              <a:t>4/4/2018</a:t>
             </a:fld>
             <a:endParaRPr lang="en-US"/>
           </a:p>
@@ -1259,7 +1259,7 @@
           <a:p>
             <a:fld id="{6455B870-2AC2-4EDD-988A-AAB36F68BD8B}" type="datetimeFigureOut">
               <a:rPr lang="en-US" smtClean="0"/>
-              <a:t>3/13/2018</a:t>
+              <a:t>4/4/2018</a:t>
             </a:fld>
             <a:endParaRPr lang="en-US"/>
           </a:p>
@@ -1626,7 +1626,7 @@
           <a:p>
             <a:fld id="{6455B870-2AC2-4EDD-988A-AAB36F68BD8B}" type="datetimeFigureOut">
               <a:rPr lang="en-US" smtClean="0"/>
-              <a:t>3/13/2018</a:t>
+              <a:t>4/4/2018</a:t>
             </a:fld>
             <a:endParaRPr lang="en-US"/>
           </a:p>
@@ -1744,7 +1744,7 @@
           <a:p>
             <a:fld id="{6455B870-2AC2-4EDD-988A-AAB36F68BD8B}" type="datetimeFigureOut">
               <a:rPr lang="en-US" smtClean="0"/>
-              <a:t>3/13/2018</a:t>
+              <a:t>4/4/2018</a:t>
             </a:fld>
             <a:endParaRPr lang="en-US"/>
           </a:p>
@@ -1839,7 +1839,7 @@
           <a:p>
             <a:fld id="{6455B870-2AC2-4EDD-988A-AAB36F68BD8B}" type="datetimeFigureOut">
               <a:rPr lang="en-US" smtClean="0"/>
-              <a:t>3/13/2018</a:t>
+              <a:t>4/4/2018</a:t>
             </a:fld>
             <a:endParaRPr lang="en-US"/>
           </a:p>
@@ -2116,7 +2116,7 @@
           <a:p>
             <a:fld id="{6455B870-2AC2-4EDD-988A-AAB36F68BD8B}" type="datetimeFigureOut">
               <a:rPr lang="en-US" smtClean="0"/>
-              <a:t>3/13/2018</a:t>
+              <a:t>4/4/2018</a:t>
             </a:fld>
             <a:endParaRPr lang="en-US"/>
           </a:p>
@@ -2373,7 +2373,7 @@
           <a:p>
             <a:fld id="{6455B870-2AC2-4EDD-988A-AAB36F68BD8B}" type="datetimeFigureOut">
               <a:rPr lang="en-US" smtClean="0"/>
-              <a:t>3/13/2018</a:t>
+              <a:t>4/4/2018</a:t>
             </a:fld>
             <a:endParaRPr lang="en-US"/>
           </a:p>
@@ -2586,7 +2586,7 @@
           <a:p>
             <a:fld id="{6455B870-2AC2-4EDD-988A-AAB36F68BD8B}" type="datetimeFigureOut">
               <a:rPr lang="en-US" smtClean="0"/>
-              <a:t>3/13/2018</a:t>
+              <a:t>4/4/2018</a:t>
             </a:fld>
             <a:endParaRPr lang="en-US"/>
           </a:p>
@@ -3019,7 +3019,7 @@
           <a:p>
             <a:r>
               <a:rPr lang="en-US" dirty="0"/>
-              <a:t>Exam 3: Energy &amp; Momentum</a:t>
+              <a:t>Exam 4: Bodies</a:t>
             </a:r>
           </a:p>
         </p:txBody>
@@ -3047,13 +3047,13 @@
           <a:p>
             <a:r>
               <a:rPr lang="en-US" dirty="0"/>
-              <a:t>Chapters 6, 7, &amp; 8</a:t>
+              <a:t>Chapters 9, 10, &amp; 11</a:t>
             </a:r>
           </a:p>
           <a:p>
             <a:r>
               <a:rPr lang="en-US" dirty="0"/>
-              <a:t>Work, Kinetic Energy, Potential Energy, Momentum, Impulse</a:t>
+              <a:t>Rotation, Equilibrium, Stress &amp; Strain</a:t>
             </a:r>
           </a:p>
         </p:txBody>
@@ -4122,7 +4122,15 @@
           <a:p>
             <a:r>
               <a:rPr lang="en-US" dirty="0"/>
-              <a:t>Chapter 6</a:t>
+              <a:t>Chapter 9 </a:t>
+            </a:r>
+            <a:r>
+              <a:rPr lang="en-US"/>
+              <a:t>– Angular </a:t>
+            </a:r>
+            <a:r>
+              <a:rPr lang="en-US" dirty="0"/>
+              <a:t>Coordinates</a:t>
             </a:r>
           </a:p>
         </p:txBody>

</xml_diff>